<commit_message>
This is the Updated PPT document
</commit_message>
<xml_diff>
--- a/Capstone Nevin Finale.pptx
+++ b/Capstone Nevin Finale.pptx
@@ -5,7 +5,7 @@
     <p:sldMasterId id="2147483648" r:id="rId1"/>
   </p:sldMasterIdLst>
   <p:notesMasterIdLst>
-    <p:notesMasterId r:id="rId30"/>
+    <p:notesMasterId r:id="rId28"/>
   </p:notesMasterIdLst>
   <p:sldIdLst>
     <p:sldId id="256" r:id="rId3"/>
@@ -32,9 +32,7 @@
     <p:sldId id="283" r:id="rId24"/>
     <p:sldId id="284" r:id="rId25"/>
     <p:sldId id="285" r:id="rId26"/>
-    <p:sldId id="258" r:id="rId27"/>
-    <p:sldId id="262" r:id="rId28"/>
-    <p:sldId id="260" r:id="rId29"/>
+    <p:sldId id="260" r:id="rId27"/>
   </p:sldIdLst>
   <p:sldSz cx="12192000" cy="6858000"/>
   <p:notesSz cx="6858000" cy="9144000"/>
@@ -5161,560 +5159,6 @@
 </file>
 
 <file path=ppt/slides/slide25.xml><?xml version="1.0" encoding="utf-8"?>
-<p:sld xmlns:a="http://schemas.openxmlformats.org/drawingml/2006/main" xmlns:r="http://schemas.openxmlformats.org/officeDocument/2006/relationships" xmlns:p="http://schemas.openxmlformats.org/presentationml/2006/main">
-  <p:cSld>
-    <p:spTree>
-      <p:nvGrpSpPr>
-        <p:cNvPr id="1" name=""/>
-        <p:cNvGrpSpPr/>
-        <p:nvPr/>
-      </p:nvGrpSpPr>
-      <p:grpSpPr>
-        <a:xfrm>
-          <a:off x="0" y="0"/>
-          <a:ext cx="0" cy="0"/>
-          <a:chOff x="0" y="0"/>
-          <a:chExt cx="0" cy="0"/>
-        </a:xfrm>
-      </p:grpSpPr>
-      <p:sp>
-        <p:nvSpPr>
-          <p:cNvPr id="2" name="Title 1"/>
-          <p:cNvSpPr>
-            <a:spLocks noGrp="1"/>
-          </p:cNvSpPr>
-          <p:nvPr>
-            <p:ph type="title"/>
-          </p:nvPr>
-        </p:nvSpPr>
-        <p:spPr/>
-        <p:txBody>
-          <a:bodyPr/>
-          <a:lstStyle/>
-          <a:p>
-            <a:r>
-              <a:rPr lang="en-US" dirty="0"/>
-              <a:t>Sub-Title 2</a:t>
-            </a:r>
-            <a:endParaRPr lang="en-US" dirty="0"/>
-          </a:p>
-        </p:txBody>
-      </p:sp>
-      <p:sp>
-        <p:nvSpPr>
-          <p:cNvPr id="4" name="Slide Number Placeholder 3"/>
-          <p:cNvSpPr>
-            <a:spLocks noGrp="1"/>
-          </p:cNvSpPr>
-          <p:nvPr>
-            <p:ph type="sldNum" sz="quarter" idx="12"/>
-          </p:nvPr>
-        </p:nvSpPr>
-        <p:spPr/>
-        <p:txBody>
-          <a:bodyPr/>
-          <a:lstStyle/>
-          <a:p>
-            <a:fld id="{D79359E6-D05C-9546-AA79-5323DC3F04EC}" type="slidenum">
-              <a:rPr lang="en-US" smtClean="0"/>
-            </a:fld>
-            <a:endParaRPr lang="en-US"/>
-          </a:p>
-        </p:txBody>
-      </p:sp>
-      <p:pic>
-        <p:nvPicPr>
-          <p:cNvPr id="5" name="Picture 4"/>
-          <p:cNvPicPr>
-            <a:picLocks noChangeAspect="1"/>
-          </p:cNvPicPr>
-          <p:nvPr/>
-        </p:nvPicPr>
-        <p:blipFill>
-          <a:blip r:embed="rId1"/>
-          <a:stretch>
-            <a:fillRect/>
-          </a:stretch>
-        </p:blipFill>
-        <p:spPr>
-          <a:xfrm>
-            <a:off x="838200" y="2008627"/>
-            <a:ext cx="3529572" cy="2321636"/>
-          </a:xfrm>
-          <a:prstGeom prst="rect">
-            <a:avLst/>
-          </a:prstGeom>
-          <a:ln>
-            <a:solidFill>
-              <a:schemeClr val="tx1"/>
-            </a:solidFill>
-          </a:ln>
-        </p:spPr>
-      </p:pic>
-      <p:sp>
-        <p:nvSpPr>
-          <p:cNvPr id="6" name="TextBox 5"/>
-          <p:cNvSpPr txBox="1"/>
-          <p:nvPr/>
-        </p:nvSpPr>
-        <p:spPr>
-          <a:xfrm>
-            <a:off x="838200" y="4463536"/>
-            <a:ext cx="2161361" cy="369332"/>
-          </a:xfrm>
-          <a:prstGeom prst="rect">
-            <a:avLst/>
-          </a:prstGeom>
-          <a:noFill/>
-        </p:spPr>
-        <p:txBody>
-          <a:bodyPr wrap="none" rtlCol="0">
-            <a:spAutoFit/>
-          </a:bodyPr>
-          <a:lstStyle/>
-          <a:p>
-            <a:r>
-              <a:rPr lang="en-US" b="1" i="1" dirty="0"/>
-              <a:t>Figure 1</a:t>
-            </a:r>
-            <a:r>
-              <a:rPr lang="en-US" dirty="0"/>
-              <a:t>. Chart title </a:t>
-            </a:r>
-            <a:endParaRPr lang="en-US" dirty="0"/>
-          </a:p>
-        </p:txBody>
-      </p:sp>
-      <p:graphicFrame>
-        <p:nvGraphicFramePr>
-          <p:cNvPr id="8" name="Table 7"/>
-          <p:cNvGraphicFramePr>
-            <a:graphicFrameLocks noGrp="1"/>
-          </p:cNvGraphicFramePr>
-          <p:nvPr/>
-        </p:nvGraphicFramePr>
-        <p:xfrm>
-          <a:off x="5623035" y="2701159"/>
-          <a:ext cx="5472386" cy="1160502"/>
-        </p:xfrm>
-        <a:graphic>
-          <a:graphicData uri="http://schemas.openxmlformats.org/drawingml/2006/table">
-            <a:tbl>
-              <a:tblPr firstRow="1" bandRow="1">
-                <a:tableStyleId>{5C22544A-7EE6-4342-B048-85BDC9FD1C3A}</a:tableStyleId>
-              </a:tblPr>
-              <a:tblGrid>
-                <a:gridCol w="2736193"/>
-                <a:gridCol w="2736193"/>
-              </a:tblGrid>
-              <a:tr h="386834">
-                <a:tc>
-                  <a:txBody>
-                    <a:bodyPr/>
-                    <a:lstStyle/>
-                    <a:p>
-                      <a:endParaRPr lang="en-US"/>
-                    </a:p>
-                  </a:txBody>
-                  <a:tcPr/>
-                </a:tc>
-                <a:tc>
-                  <a:txBody>
-                    <a:bodyPr/>
-                    <a:lstStyle/>
-                    <a:p>
-                      <a:endParaRPr lang="en-US"/>
-                    </a:p>
-                  </a:txBody>
-                  <a:tcPr/>
-                </a:tc>
-              </a:tr>
-              <a:tr h="386834">
-                <a:tc>
-                  <a:txBody>
-                    <a:bodyPr/>
-                    <a:lstStyle/>
-                    <a:p>
-                      <a:endParaRPr lang="en-US"/>
-                    </a:p>
-                  </a:txBody>
-                  <a:tcPr/>
-                </a:tc>
-                <a:tc>
-                  <a:txBody>
-                    <a:bodyPr/>
-                    <a:lstStyle/>
-                    <a:p>
-                      <a:endParaRPr lang="en-US"/>
-                    </a:p>
-                  </a:txBody>
-                  <a:tcPr/>
-                </a:tc>
-              </a:tr>
-              <a:tr h="386834">
-                <a:tc>
-                  <a:txBody>
-                    <a:bodyPr/>
-                    <a:lstStyle/>
-                    <a:p>
-                      <a:endParaRPr lang="en-US"/>
-                    </a:p>
-                  </a:txBody>
-                  <a:tcPr/>
-                </a:tc>
-                <a:tc>
-                  <a:txBody>
-                    <a:bodyPr/>
-                    <a:lstStyle/>
-                    <a:p>
-                      <a:endParaRPr lang="en-US" dirty="0"/>
-                    </a:p>
-                  </a:txBody>
-                  <a:tcPr/>
-                </a:tc>
-              </a:tr>
-            </a:tbl>
-          </a:graphicData>
-        </a:graphic>
-      </p:graphicFrame>
-      <p:sp>
-        <p:nvSpPr>
-          <p:cNvPr id="9" name="TextBox 8"/>
-          <p:cNvSpPr txBox="1"/>
-          <p:nvPr/>
-        </p:nvSpPr>
-        <p:spPr>
-          <a:xfrm>
-            <a:off x="5623035" y="2331827"/>
-            <a:ext cx="2039020" cy="369332"/>
-          </a:xfrm>
-          <a:prstGeom prst="rect">
-            <a:avLst/>
-          </a:prstGeom>
-          <a:noFill/>
-        </p:spPr>
-        <p:txBody>
-          <a:bodyPr wrap="none" rtlCol="0">
-            <a:spAutoFit/>
-          </a:bodyPr>
-          <a:lstStyle/>
-          <a:p>
-            <a:r>
-              <a:rPr lang="en-US" b="1" i="1" dirty="0"/>
-              <a:t>Table 1</a:t>
-            </a:r>
-            <a:r>
-              <a:rPr lang="en-US" dirty="0"/>
-              <a:t>. Table title </a:t>
-            </a:r>
-            <a:endParaRPr lang="en-US" dirty="0"/>
-          </a:p>
-        </p:txBody>
-      </p:sp>
-    </p:spTree>
-  </p:cSld>
-  <p:clrMapOvr>
-    <a:masterClrMapping/>
-  </p:clrMapOvr>
-</p:sld>
-</file>
-
-<file path=ppt/slides/slide26.xml><?xml version="1.0" encoding="utf-8"?>
-<p:sld xmlns:a="http://schemas.openxmlformats.org/drawingml/2006/main" xmlns:r="http://schemas.openxmlformats.org/officeDocument/2006/relationships" xmlns:p="http://schemas.openxmlformats.org/presentationml/2006/main">
-  <p:cSld>
-    <p:spTree>
-      <p:nvGrpSpPr>
-        <p:cNvPr id="1" name=""/>
-        <p:cNvGrpSpPr/>
-        <p:nvPr/>
-      </p:nvGrpSpPr>
-      <p:grpSpPr>
-        <a:xfrm>
-          <a:off x="0" y="0"/>
-          <a:ext cx="0" cy="0"/>
-          <a:chOff x="0" y="0"/>
-          <a:chExt cx="0" cy="0"/>
-        </a:xfrm>
-      </p:grpSpPr>
-      <p:sp>
-        <p:nvSpPr>
-          <p:cNvPr id="2" name="Title 1"/>
-          <p:cNvSpPr>
-            <a:spLocks noGrp="1"/>
-          </p:cNvSpPr>
-          <p:nvPr>
-            <p:ph type="title"/>
-          </p:nvPr>
-        </p:nvSpPr>
-        <p:spPr/>
-        <p:txBody>
-          <a:bodyPr/>
-          <a:lstStyle/>
-          <a:p>
-            <a:r>
-              <a:rPr lang="en-US" dirty="0"/>
-              <a:t>Reference</a:t>
-            </a:r>
-            <a:endParaRPr lang="en-US" dirty="0"/>
-          </a:p>
-        </p:txBody>
-      </p:sp>
-      <p:sp>
-        <p:nvSpPr>
-          <p:cNvPr id="3" name="Content Placeholder 2"/>
-          <p:cNvSpPr>
-            <a:spLocks noGrp="1"/>
-          </p:cNvSpPr>
-          <p:nvPr>
-            <p:ph idx="1"/>
-          </p:nvPr>
-        </p:nvSpPr>
-        <p:spPr/>
-        <p:txBody>
-          <a:bodyPr/>
-          <a:lstStyle/>
-          <a:p>
-            <a:r>
-              <a:rPr lang="en-US" dirty="0"/>
-              <a:t>Use latest APA style referencing</a:t>
-            </a:r>
-            <a:endParaRPr lang="en-US" dirty="0"/>
-          </a:p>
-        </p:txBody>
-      </p:sp>
-      <p:sp>
-        <p:nvSpPr>
-          <p:cNvPr id="4" name="Slide Number Placeholder 3"/>
-          <p:cNvSpPr>
-            <a:spLocks noGrp="1"/>
-          </p:cNvSpPr>
-          <p:nvPr>
-            <p:ph type="sldNum" sz="quarter" idx="12"/>
-          </p:nvPr>
-        </p:nvSpPr>
-        <p:spPr/>
-        <p:txBody>
-          <a:bodyPr/>
-          <a:lstStyle/>
-          <a:p>
-            <a:fld id="{D79359E6-D05C-9546-AA79-5323DC3F04EC}" type="slidenum">
-              <a:rPr lang="en-US" smtClean="0"/>
-            </a:fld>
-            <a:endParaRPr lang="en-US"/>
-          </a:p>
-        </p:txBody>
-      </p:sp>
-      <p:sp>
-        <p:nvSpPr>
-          <p:cNvPr id="5" name="Content Placeholder 2"/>
-          <p:cNvSpPr>
-            <a:spLocks noGrp="1"/>
-          </p:cNvSpPr>
-          <p:nvPr/>
-        </p:nvSpPr>
-        <p:spPr>
-          <a:xfrm>
-            <a:off x="897890" y="2506345"/>
-            <a:ext cx="10515600" cy="4351338"/>
-          </a:xfrm>
-          <a:prstGeom prst="rect">
-            <a:avLst/>
-          </a:prstGeom>
-        </p:spPr>
-        <p:txBody>
-          <a:bodyPr vert="horz" lIns="91440" tIns="45720" rIns="91440" bIns="45720" rtlCol="0">
-            <a:normAutofit/>
-          </a:bodyPr>
-          <a:lstStyle>
-            <a:lvl1pPr marL="228600" indent="-228600" algn="l" defTabSz="914400" rtl="0" eaLnBrk="1" latinLnBrk="0" hangingPunct="1">
-              <a:lnSpc>
-                <a:spcPct val="90000"/>
-              </a:lnSpc>
-              <a:spcBef>
-                <a:spcPts val="1000"/>
-              </a:spcBef>
-              <a:buFont typeface="Arial" panose="020B0604020202020204" pitchFamily="34" charset="0"/>
-              <a:buChar char="•"/>
-              <a:defRPr sz="2800" kern="1200">
-                <a:solidFill>
-                  <a:schemeClr val="tx1"/>
-                </a:solidFill>
-                <a:latin typeface="+mn-lt"/>
-                <a:ea typeface="+mn-ea"/>
-                <a:cs typeface="+mn-cs"/>
-              </a:defRPr>
-            </a:lvl1pPr>
-            <a:lvl2pPr marL="685800" indent="-228600" algn="l" defTabSz="914400" rtl="0" eaLnBrk="1" latinLnBrk="0" hangingPunct="1">
-              <a:lnSpc>
-                <a:spcPct val="90000"/>
-              </a:lnSpc>
-              <a:spcBef>
-                <a:spcPts val="500"/>
-              </a:spcBef>
-              <a:buFont typeface="Arial" panose="020B0604020202020204" pitchFamily="34" charset="0"/>
-              <a:buChar char="•"/>
-              <a:defRPr sz="2400" kern="1200">
-                <a:solidFill>
-                  <a:schemeClr val="tx1"/>
-                </a:solidFill>
-                <a:latin typeface="+mn-lt"/>
-                <a:ea typeface="+mn-ea"/>
-                <a:cs typeface="+mn-cs"/>
-              </a:defRPr>
-            </a:lvl2pPr>
-            <a:lvl3pPr marL="1143000" indent="-228600" algn="l" defTabSz="914400" rtl="0" eaLnBrk="1" latinLnBrk="0" hangingPunct="1">
-              <a:lnSpc>
-                <a:spcPct val="90000"/>
-              </a:lnSpc>
-              <a:spcBef>
-                <a:spcPts val="500"/>
-              </a:spcBef>
-              <a:buFont typeface="Arial" panose="020B0604020202020204" pitchFamily="34" charset="0"/>
-              <a:buChar char="•"/>
-              <a:defRPr sz="2000" kern="1200">
-                <a:solidFill>
-                  <a:schemeClr val="tx1"/>
-                </a:solidFill>
-                <a:latin typeface="+mn-lt"/>
-                <a:ea typeface="+mn-ea"/>
-                <a:cs typeface="+mn-cs"/>
-              </a:defRPr>
-            </a:lvl3pPr>
-            <a:lvl4pPr marL="1600200" indent="-228600" algn="l" defTabSz="914400" rtl="0" eaLnBrk="1" latinLnBrk="0" hangingPunct="1">
-              <a:lnSpc>
-                <a:spcPct val="90000"/>
-              </a:lnSpc>
-              <a:spcBef>
-                <a:spcPts val="500"/>
-              </a:spcBef>
-              <a:buFont typeface="Arial" panose="020B0604020202020204" pitchFamily="34" charset="0"/>
-              <a:buChar char="•"/>
-              <a:defRPr sz="1800" kern="1200">
-                <a:solidFill>
-                  <a:schemeClr val="tx1"/>
-                </a:solidFill>
-                <a:latin typeface="+mn-lt"/>
-                <a:ea typeface="+mn-ea"/>
-                <a:cs typeface="+mn-cs"/>
-              </a:defRPr>
-            </a:lvl4pPr>
-            <a:lvl5pPr marL="2057400" indent="-228600" algn="l" defTabSz="914400" rtl="0" eaLnBrk="1" latinLnBrk="0" hangingPunct="1">
-              <a:lnSpc>
-                <a:spcPct val="90000"/>
-              </a:lnSpc>
-              <a:spcBef>
-                <a:spcPts val="500"/>
-              </a:spcBef>
-              <a:buFont typeface="Arial" panose="020B0604020202020204" pitchFamily="34" charset="0"/>
-              <a:buChar char="•"/>
-              <a:defRPr sz="1800" kern="1200">
-                <a:solidFill>
-                  <a:schemeClr val="tx1"/>
-                </a:solidFill>
-                <a:latin typeface="+mn-lt"/>
-                <a:ea typeface="+mn-ea"/>
-                <a:cs typeface="+mn-cs"/>
-              </a:defRPr>
-            </a:lvl5pPr>
-            <a:lvl6pPr marL="2514600" indent="-228600" algn="l" defTabSz="914400" rtl="0" eaLnBrk="1" latinLnBrk="0" hangingPunct="1">
-              <a:lnSpc>
-                <a:spcPct val="90000"/>
-              </a:lnSpc>
-              <a:spcBef>
-                <a:spcPts val="500"/>
-              </a:spcBef>
-              <a:buFont typeface="Arial" panose="020B0604020202020204" pitchFamily="34" charset="0"/>
-              <a:buChar char="•"/>
-              <a:defRPr sz="1800" kern="1200">
-                <a:solidFill>
-                  <a:schemeClr val="tx1"/>
-                </a:solidFill>
-                <a:latin typeface="+mn-lt"/>
-                <a:ea typeface="+mn-ea"/>
-                <a:cs typeface="+mn-cs"/>
-              </a:defRPr>
-            </a:lvl6pPr>
-            <a:lvl7pPr marL="2971800" indent="-228600" algn="l" defTabSz="914400" rtl="0" eaLnBrk="1" latinLnBrk="0" hangingPunct="1">
-              <a:lnSpc>
-                <a:spcPct val="90000"/>
-              </a:lnSpc>
-              <a:spcBef>
-                <a:spcPts val="500"/>
-              </a:spcBef>
-              <a:buFont typeface="Arial" panose="020B0604020202020204" pitchFamily="34" charset="0"/>
-              <a:buChar char="•"/>
-              <a:defRPr sz="1800" kern="1200">
-                <a:solidFill>
-                  <a:schemeClr val="tx1"/>
-                </a:solidFill>
-                <a:latin typeface="+mn-lt"/>
-                <a:ea typeface="+mn-ea"/>
-                <a:cs typeface="+mn-cs"/>
-              </a:defRPr>
-            </a:lvl7pPr>
-            <a:lvl8pPr marL="3429000" indent="-228600" algn="l" defTabSz="914400" rtl="0" eaLnBrk="1" latinLnBrk="0" hangingPunct="1">
-              <a:lnSpc>
-                <a:spcPct val="90000"/>
-              </a:lnSpc>
-              <a:spcBef>
-                <a:spcPts val="500"/>
-              </a:spcBef>
-              <a:buFont typeface="Arial" panose="020B0604020202020204" pitchFamily="34" charset="0"/>
-              <a:buChar char="•"/>
-              <a:defRPr sz="1800" kern="1200">
-                <a:solidFill>
-                  <a:schemeClr val="tx1"/>
-                </a:solidFill>
-                <a:latin typeface="+mn-lt"/>
-                <a:ea typeface="+mn-ea"/>
-                <a:cs typeface="+mn-cs"/>
-              </a:defRPr>
-            </a:lvl8pPr>
-            <a:lvl9pPr marL="3886200" indent="-228600" algn="l" defTabSz="914400" rtl="0" eaLnBrk="1" latinLnBrk="0" hangingPunct="1">
-              <a:lnSpc>
-                <a:spcPct val="90000"/>
-              </a:lnSpc>
-              <a:spcBef>
-                <a:spcPts val="500"/>
-              </a:spcBef>
-              <a:buFont typeface="Arial" panose="020B0604020202020204" pitchFamily="34" charset="0"/>
-              <a:buChar char="•"/>
-              <a:defRPr sz="1800" kern="1200">
-                <a:solidFill>
-                  <a:schemeClr val="tx1"/>
-                </a:solidFill>
-                <a:latin typeface="+mn-lt"/>
-                <a:ea typeface="+mn-ea"/>
-                <a:cs typeface="+mn-cs"/>
-              </a:defRPr>
-            </a:lvl9pPr>
-          </a:lstStyle>
-          <a:p>
-            <a:r>
-              <a:rPr lang="en-US" dirty="0"/>
-              <a:t>https://</a:t>
-            </a:r>
-            <a:r>
-              <a:rPr lang="en-US" dirty="0" err="1"/>
-              <a:t>libguides.nus.edu.sg</a:t>
-            </a:r>
-            <a:r>
-              <a:rPr lang="en-US" dirty="0"/>
-              <a:t>/APA/intext</a:t>
-            </a:r>
-            <a:endParaRPr lang="en-US" dirty="0"/>
-          </a:p>
-        </p:txBody>
-      </p:sp>
-    </p:spTree>
-  </p:cSld>
-  <p:clrMapOvr>
-    <a:masterClrMapping/>
-  </p:clrMapOvr>
-</p:sld>
-</file>
-
-<file path=ppt/slides/slide27.xml><?xml version="1.0" encoding="utf-8"?>
 <p:sld xmlns:a="http://schemas.openxmlformats.org/drawingml/2006/main" xmlns:r="http://schemas.openxmlformats.org/officeDocument/2006/relationships" xmlns:p="http://schemas.openxmlformats.org/presentationml/2006/main">
   <p:cSld>
     <p:spTree>

</xml_diff>